<commit_message>
Add detail, country and friends pages
</commit_message>
<xml_diff>
--- a/Smart-clik.pptx
+++ b/Smart-clik.pptx
@@ -112,6 +112,11 @@
       </a:defRPr>
     </a:lvl9pPr>
   </p:defaultTextStyle>
+  <p:extLst>
+    <p:ext uri="{EFAFB233-063F-42B5-8137-9DF3F51BA10A}">
+      <p15:sldGuideLst xmlns:p15="http://schemas.microsoft.com/office/powerpoint/2012/main"/>
+    </p:ext>
+  </p:extLst>
 </p:presentation>
 </file>
 
@@ -1586,6 +1591,13 @@
         </dgm:presLayoutVars>
       </dgm:prSet>
       <dgm:spPr/>
+      <dgm:t>
+        <a:bodyPr/>
+        <a:lstStyle/>
+        <a:p>
+          <a:endParaRPr lang="fr-FR"/>
+        </a:p>
+      </dgm:t>
     </dgm:pt>
     <dgm:pt modelId="{CCB7A617-71C6-4812-B3F2-A301D85B4E09}" type="pres">
       <dgm:prSet presAssocID="{DEC22A11-969F-4F5C-9D59-699DD54FEC02}" presName="root" presStyleCnt="0">
@@ -1658,6 +1670,13 @@
         </dgm:presLayoutVars>
       </dgm:prSet>
       <dgm:spPr/>
+      <dgm:t>
+        <a:bodyPr/>
+        <a:lstStyle/>
+        <a:p>
+          <a:endParaRPr lang="fr-FR"/>
+        </a:p>
+      </dgm:t>
     </dgm:pt>
     <dgm:pt modelId="{627D3A09-8CB0-448C-9EF9-79184D308EFC}" type="pres">
       <dgm:prSet presAssocID="{41366F81-C99B-44B0-BFBA-FF5335E1DCF6}" presName="childComposite" presStyleCnt="0">
@@ -1681,6 +1700,13 @@
         </dgm:presLayoutVars>
       </dgm:prSet>
       <dgm:spPr/>
+      <dgm:t>
+        <a:bodyPr/>
+        <a:lstStyle/>
+        <a:p>
+          <a:endParaRPr lang="fr-FR"/>
+        </a:p>
+      </dgm:t>
     </dgm:pt>
     <dgm:pt modelId="{F975DEE5-2DCE-41EA-80AB-47CB7105CB37}" type="pres">
       <dgm:prSet presAssocID="{97849881-898F-42A8-A275-175CB69A2C52}" presName="childComposite" presStyleCnt="0">
@@ -1704,6 +1730,13 @@
         </dgm:presLayoutVars>
       </dgm:prSet>
       <dgm:spPr/>
+      <dgm:t>
+        <a:bodyPr/>
+        <a:lstStyle/>
+        <a:p>
+          <a:endParaRPr lang="fr-FR"/>
+        </a:p>
+      </dgm:t>
     </dgm:pt>
     <dgm:pt modelId="{36ECED2E-B08B-4ADB-9C49-C48F0BE888E6}" type="pres">
       <dgm:prSet presAssocID="{31290AF6-311E-45E6-A478-B3B58A48ADF6}" presName="childComposite" presStyleCnt="0">
@@ -1806,6 +1839,13 @@
         </dgm:presLayoutVars>
       </dgm:prSet>
       <dgm:spPr/>
+      <dgm:t>
+        <a:bodyPr/>
+        <a:lstStyle/>
+        <a:p>
+          <a:endParaRPr lang="fr-FR"/>
+        </a:p>
+      </dgm:t>
     </dgm:pt>
     <dgm:pt modelId="{CB86272C-8145-4F40-9EF9-7CB88299C3E4}" type="pres">
       <dgm:prSet presAssocID="{623F9E21-DDCB-410F-9B34-A8F4A6FC1E83}" presName="childComposite" presStyleCnt="0">
@@ -1859,6 +1899,13 @@
         </dgm:presLayoutVars>
       </dgm:prSet>
       <dgm:spPr/>
+      <dgm:t>
+        <a:bodyPr/>
+        <a:lstStyle/>
+        <a:p>
+          <a:endParaRPr lang="fr-FR"/>
+        </a:p>
+      </dgm:t>
     </dgm:pt>
     <dgm:pt modelId="{C35D28E3-4974-4CE9-ACBE-D3DEBB37931E}" type="pres">
       <dgm:prSet presAssocID="{DD9FE355-7D2D-40A1-9742-5D69D7A3ABD0}" presName="childComposite" presStyleCnt="0">
@@ -1882,6 +1929,13 @@
         </dgm:presLayoutVars>
       </dgm:prSet>
       <dgm:spPr/>
+      <dgm:t>
+        <a:bodyPr/>
+        <a:lstStyle/>
+        <a:p>
+          <a:endParaRPr lang="fr-FR"/>
+        </a:p>
+      </dgm:t>
     </dgm:pt>
     <dgm:pt modelId="{50430825-50D2-4E4C-882D-A2B9FF9CC56B}" type="pres">
       <dgm:prSet presAssocID="{3C4E11F8-D49D-484B-B6E2-1B571D49A130}" presName="root" presStyleCnt="0">
@@ -1954,6 +2008,13 @@
         </dgm:presLayoutVars>
       </dgm:prSet>
       <dgm:spPr/>
+      <dgm:t>
+        <a:bodyPr/>
+        <a:lstStyle/>
+        <a:p>
+          <a:endParaRPr lang="fr-FR"/>
+        </a:p>
+      </dgm:t>
     </dgm:pt>
     <dgm:pt modelId="{3B324F48-0B6F-4A8D-B459-7E1A9A136164}" type="pres">
       <dgm:prSet presAssocID="{3C540172-9963-444D-89EF-B6A1458E4567}" presName="childComposite" presStyleCnt="0">
@@ -1977,6 +2038,13 @@
         </dgm:presLayoutVars>
       </dgm:prSet>
       <dgm:spPr/>
+      <dgm:t>
+        <a:bodyPr/>
+        <a:lstStyle/>
+        <a:p>
+          <a:endParaRPr lang="fr-FR"/>
+        </a:p>
+      </dgm:t>
     </dgm:pt>
     <dgm:pt modelId="{49F45A70-ED8E-4D73-A5F3-20C8A2362587}" type="pres">
       <dgm:prSet presAssocID="{531106A9-CA6F-45CA-A702-2B88920528F0}" presName="childComposite" presStyleCnt="0">
@@ -2000,6 +2068,13 @@
         </dgm:presLayoutVars>
       </dgm:prSet>
       <dgm:spPr/>
+      <dgm:t>
+        <a:bodyPr/>
+        <a:lstStyle/>
+        <a:p>
+          <a:endParaRPr lang="fr-FR"/>
+        </a:p>
+      </dgm:t>
     </dgm:pt>
     <dgm:pt modelId="{53A3CC1E-7006-47F4-AA0F-39BC5E9FBA29}" type="pres">
       <dgm:prSet presAssocID="{FE4C6D14-652B-4754-8144-3905E159B0D0}" presName="childComposite" presStyleCnt="0">
@@ -2023,6 +2098,13 @@
         </dgm:presLayoutVars>
       </dgm:prSet>
       <dgm:spPr/>
+      <dgm:t>
+        <a:bodyPr/>
+        <a:lstStyle/>
+        <a:p>
+          <a:endParaRPr lang="fr-FR"/>
+        </a:p>
+      </dgm:t>
     </dgm:pt>
     <dgm:pt modelId="{7B96B789-904D-4009-9A1C-2DF05A819F8C}" type="pres">
       <dgm:prSet presAssocID="{EFD6C8A7-C515-4683-B953-5A1F56185962}" presName="root" presStyleCnt="0">
@@ -2135,43 +2217,43 @@
     </dgm:pt>
   </dgm:ptLst>
   <dgm:cxnLst>
+    <dgm:cxn modelId="{1C991F4A-C02C-4909-811B-0E4D8A4446A3}" type="presOf" srcId="{76CA6376-0F0E-4E77-B3F4-6EF99DABEA85}" destId="{F05686A4-A2B9-4FA6-A422-04E2CA5C53D1}" srcOrd="0" destOrd="0" presId="urn:microsoft.com/office/officeart/2008/layout/SquareAccentList"/>
+    <dgm:cxn modelId="{EC195A86-FB41-49CB-BE2D-1109561B9CC7}" type="presOf" srcId="{4FE79E4A-F949-4908-938E-1ED9796B9982}" destId="{BA762BEE-3C48-4825-9C31-9842B6DBBEE2}" srcOrd="0" destOrd="0" presId="urn:microsoft.com/office/officeart/2008/layout/SquareAccentList"/>
+    <dgm:cxn modelId="{DDF9367F-FA5F-4005-AA1C-4A0B4C4F3595}" type="presOf" srcId="{623F9E21-DDCB-410F-9B34-A8F4A6FC1E83}" destId="{87887977-70EC-400C-9C83-7A9F6BB1988F}" srcOrd="0" destOrd="0" presId="urn:microsoft.com/office/officeart/2008/layout/SquareAccentList"/>
+    <dgm:cxn modelId="{FE51D39D-29BA-4D0D-A71E-2761AF395740}" type="presOf" srcId="{FE4C6D14-652B-4754-8144-3905E159B0D0}" destId="{8DFBFBA1-7B84-45FB-8ED0-82B80BDF7580}" srcOrd="0" destOrd="0" presId="urn:microsoft.com/office/officeart/2008/layout/SquareAccentList"/>
+    <dgm:cxn modelId="{30EFFEEB-1ED5-4C6B-ACB8-3DACFA0C0858}" type="presOf" srcId="{41366F81-C99B-44B0-BFBA-FF5335E1DCF6}" destId="{F5CFFDEF-372A-412A-A7D4-12262D66B256}" srcOrd="0" destOrd="0" presId="urn:microsoft.com/office/officeart/2008/layout/SquareAccentList"/>
+    <dgm:cxn modelId="{7451E383-4758-4679-8A9C-74C514174141}" type="presOf" srcId="{97849881-898F-42A8-A275-175CB69A2C52}" destId="{ACEE5B07-718E-43D3-84A6-02D4F4CBC349}" srcOrd="0" destOrd="0" presId="urn:microsoft.com/office/officeart/2008/layout/SquareAccentList"/>
+    <dgm:cxn modelId="{BE98725E-4EF4-4876-9042-5F6E38A0C7CA}" srcId="{DEC22A11-969F-4F5C-9D59-699DD54FEC02}" destId="{97849881-898F-42A8-A275-175CB69A2C52}" srcOrd="2" destOrd="0" parTransId="{3F681C48-1061-4087-A56E-59553125F8B5}" sibTransId="{6C6160B7-72F2-4FBB-A909-1D748A14B09A}"/>
+    <dgm:cxn modelId="{B95454D5-79D3-4449-AD18-8056862A8634}" type="presOf" srcId="{EFD6C8A7-C515-4683-B953-5A1F56185962}" destId="{22A10F88-F808-4A46-B596-746C2EDD5252}" srcOrd="0" destOrd="0" presId="urn:microsoft.com/office/officeart/2008/layout/SquareAccentList"/>
+    <dgm:cxn modelId="{3A82DE48-2D47-4E1C-8F00-71ED647A8688}" srcId="{3C4E11F8-D49D-484B-B6E2-1B571D49A130}" destId="{FE4C6D14-652B-4754-8144-3905E159B0D0}" srcOrd="3" destOrd="0" parTransId="{B0545279-5BC2-42F8-B2F6-956DD6B3E0FE}" sibTransId="{03157E48-4330-4B6C-AF5B-DDF42CB27CFA}"/>
+    <dgm:cxn modelId="{70D10CCE-E96E-496D-B8CF-6CF846BA53A8}" type="presOf" srcId="{531106A9-CA6F-45CA-A702-2B88920528F0}" destId="{27EE411C-4136-487D-A31D-854035A26545}" srcOrd="0" destOrd="0" presId="urn:microsoft.com/office/officeart/2008/layout/SquareAccentList"/>
+    <dgm:cxn modelId="{CA46F927-CF5E-4B4C-92CE-29C5887339A6}" type="presOf" srcId="{DD9FE355-7D2D-40A1-9742-5D69D7A3ABD0}" destId="{9EF74576-6D0C-4892-9ABF-59D675C276E6}" srcOrd="0" destOrd="0" presId="urn:microsoft.com/office/officeart/2008/layout/SquareAccentList"/>
+    <dgm:cxn modelId="{C8A443CF-BF49-4C70-B822-B125E61903B0}" srcId="{3C4E11F8-D49D-484B-B6E2-1B571D49A130}" destId="{531106A9-CA6F-45CA-A702-2B88920528F0}" srcOrd="2" destOrd="0" parTransId="{E0768FC5-6EEA-4BB4-A2C6-1F612CD3FA34}" sibTransId="{F3D16B34-E634-43EF-99E6-DDC8642C89BC}"/>
+    <dgm:cxn modelId="{8AE2E80A-E470-4090-B0F6-769DB2DC4F2A}" type="presOf" srcId="{31290AF6-311E-45E6-A478-B3B58A48ADF6}" destId="{D512A050-8FCF-4C71-8C1B-1FEFBE81412B}" srcOrd="0" destOrd="0" presId="urn:microsoft.com/office/officeart/2008/layout/SquareAccentList"/>
+    <dgm:cxn modelId="{928ED363-C61E-4876-9DCA-C2105DA4F8F5}" type="presOf" srcId="{73ADEAC4-E51C-45E9-86C5-46042CCE50AB}" destId="{12620D22-6796-44F3-B441-49330605DF76}" srcOrd="0" destOrd="0" presId="urn:microsoft.com/office/officeart/2008/layout/SquareAccentList"/>
     <dgm:cxn modelId="{2753D4EB-DB15-4A1F-9782-2DE916995934}" type="presOf" srcId="{EB58503F-2E83-4AA4-A594-EC8E4D92B058}" destId="{3ACDD188-D9B3-492C-9212-B96CB341E016}" srcOrd="0" destOrd="0" presId="urn:microsoft.com/office/officeart/2008/layout/SquareAccentList"/>
+    <dgm:cxn modelId="{32447F68-0577-4B00-9418-EFB49A1E074F}" type="presOf" srcId="{0058D066-705F-4BC8-B6CD-3F2AD6A31272}" destId="{33545145-4AD1-4CFA-9EFE-1032A1D1E3C3}" srcOrd="0" destOrd="0" presId="urn:microsoft.com/office/officeart/2008/layout/SquareAccentList"/>
+    <dgm:cxn modelId="{41CB56EC-E15B-4213-9B71-59D9911542D8}" srcId="{0058D066-705F-4BC8-B6CD-3F2AD6A31272}" destId="{DD9FE355-7D2D-40A1-9742-5D69D7A3ABD0}" srcOrd="3" destOrd="0" parTransId="{63A91A8A-D721-469E-81A1-8A511F645AD9}" sibTransId="{1EAC100E-1E6A-410B-AC6D-51306040681A}"/>
+    <dgm:cxn modelId="{44AEEC49-8089-4653-9D0B-72F03B5EA41C}" type="presOf" srcId="{A1BABEAD-CBC7-46B2-B177-70DE57BC100A}" destId="{2A2D3285-D5AF-4142-9021-DE4EBBEC11B9}" srcOrd="0" destOrd="0" presId="urn:microsoft.com/office/officeart/2008/layout/SquareAccentList"/>
+    <dgm:cxn modelId="{127CBC0E-35BB-4D48-BD25-CCA9A2EF20DE}" srcId="{A1BABEAD-CBC7-46B2-B177-70DE57BC100A}" destId="{DEC22A11-969F-4F5C-9D59-699DD54FEC02}" srcOrd="0" destOrd="0" parTransId="{6C661981-EA3B-45CF-B978-0EFB13D316CF}" sibTransId="{48BF2438-A9D8-4452-9013-A4A3FE279C7E}"/>
     <dgm:cxn modelId="{6824B38B-D961-4B18-B726-59577EF59D10}" srcId="{DEC22A11-969F-4F5C-9D59-699DD54FEC02}" destId="{41366F81-C99B-44B0-BFBA-FF5335E1DCF6}" srcOrd="1" destOrd="0" parTransId="{11F7F744-1F3D-4A6E-A9BB-DF6852FF1325}" sibTransId="{301C5BB0-3FF2-49C9-808F-ED30AD270E5E}"/>
+    <dgm:cxn modelId="{44C7EA5B-F0EC-43E7-AA3D-7D85830DEA6F}" type="presOf" srcId="{3C4E11F8-D49D-484B-B6E2-1B571D49A130}" destId="{023E5550-301C-46DB-9CD8-14629E504E3A}" srcOrd="0" destOrd="0" presId="urn:microsoft.com/office/officeart/2008/layout/SquareAccentList"/>
+    <dgm:cxn modelId="{20F0234D-FE0F-4D45-A853-1474C401E88C}" srcId="{EFD6C8A7-C515-4683-B953-5A1F56185962}" destId="{4FE79E4A-F949-4908-938E-1ED9796B9982}" srcOrd="1" destOrd="0" parTransId="{04495225-83E4-4D15-B255-949CC081F866}" sibTransId="{D893D332-A425-4BD5-BD93-43F228AEAB64}"/>
+    <dgm:cxn modelId="{D2F63BBE-4E71-464B-A231-DF311DC323CD}" srcId="{EFD6C8A7-C515-4683-B953-5A1F56185962}" destId="{73ADEAC4-E51C-45E9-86C5-46042CCE50AB}" srcOrd="0" destOrd="0" parTransId="{6443C2B3-18DA-41D8-B5D2-A79323ECF104}" sibTransId="{B253071A-C795-4781-AE8F-9393FACC7C0A}"/>
+    <dgm:cxn modelId="{0839AB7B-DB14-444B-800C-787963C4226D}" srcId="{DEC22A11-969F-4F5C-9D59-699DD54FEC02}" destId="{31290AF6-311E-45E6-A478-B3B58A48ADF6}" srcOrd="3" destOrd="0" parTransId="{F24DD968-5EC0-4882-AE94-EA072EBB6E21}" sibTransId="{E9D954F8-7F66-404D-8893-034E7C6F0040}"/>
     <dgm:cxn modelId="{6998E49F-347A-4C83-9C42-F8BBE7A4337A}" type="presOf" srcId="{A037CA64-D3FB-49B1-9EAC-682C703A0791}" destId="{AC6F24EB-9973-4720-8AE7-B33D2C7F02B8}" srcOrd="0" destOrd="0" presId="urn:microsoft.com/office/officeart/2008/layout/SquareAccentList"/>
-    <dgm:cxn modelId="{30EFFEEB-1ED5-4C6B-ACB8-3DACFA0C0858}" type="presOf" srcId="{41366F81-C99B-44B0-BFBA-FF5335E1DCF6}" destId="{F5CFFDEF-372A-412A-A7D4-12262D66B256}" srcOrd="0" destOrd="0" presId="urn:microsoft.com/office/officeart/2008/layout/SquareAccentList"/>
+    <dgm:cxn modelId="{EC23907D-EC4A-4FB8-9DBF-3B56D3B5275F}" srcId="{0058D066-705F-4BC8-B6CD-3F2AD6A31272}" destId="{EB58503F-2E83-4AA4-A594-EC8E4D92B058}" srcOrd="2" destOrd="0" parTransId="{955381EE-DBF2-41D5-BFD9-86D645E0363A}" sibTransId="{112FC456-AB59-4593-AA19-EC7A05760D89}"/>
+    <dgm:cxn modelId="{8C1B4139-16C2-4E63-A60C-3C2552123055}" srcId="{0058D066-705F-4BC8-B6CD-3F2AD6A31272}" destId="{76CA6376-0F0E-4E77-B3F4-6EF99DABEA85}" srcOrd="0" destOrd="0" parTransId="{AB4106D6-40EE-459D-9D27-9249518709FF}" sibTransId="{9D47891C-3450-4CC8-9072-232BBE565B07}"/>
+    <dgm:cxn modelId="{FD8A43DF-8155-4809-83FA-3EAE501CD68D}" type="presOf" srcId="{7F09A95F-82A9-4AC9-A89D-B7421A924784}" destId="{9B6DFE0E-5070-4129-9586-A550CD8EC006}" srcOrd="0" destOrd="0" presId="urn:microsoft.com/office/officeart/2008/layout/SquareAccentList"/>
+    <dgm:cxn modelId="{36CF7135-5220-4002-9E5C-2C092BBE29D2}" srcId="{3C4E11F8-D49D-484B-B6E2-1B571D49A130}" destId="{3C540172-9963-444D-89EF-B6A1458E4567}" srcOrd="1" destOrd="0" parTransId="{FD7D7879-6A9E-414B-B1EA-FCC989E427E8}" sibTransId="{C47D3724-DD8A-457D-81D9-A308C47B333C}"/>
+    <dgm:cxn modelId="{41B32658-0B90-41EE-9E19-19433B674893}" srcId="{A1BABEAD-CBC7-46B2-B177-70DE57BC100A}" destId="{3C4E11F8-D49D-484B-B6E2-1B571D49A130}" srcOrd="2" destOrd="0" parTransId="{1ED56E8B-4A8C-41FC-A967-DD544C467CC7}" sibTransId="{5697297A-EB04-4F29-A467-12140496CF77}"/>
+    <dgm:cxn modelId="{3C1B278A-4150-40E7-ADD2-037B26EA0998}" srcId="{DEC22A11-969F-4F5C-9D59-699DD54FEC02}" destId="{A037CA64-D3FB-49B1-9EAC-682C703A0791}" srcOrd="0" destOrd="0" parTransId="{3DE13768-1DBA-4A6D-8DB0-B684F742B04F}" sibTransId="{38ED1C71-A55B-433B-83F2-AE33C54534A3}"/>
+    <dgm:cxn modelId="{0A1D0C1F-9614-479A-8725-7370E5FF8309}" srcId="{3C4E11F8-D49D-484B-B6E2-1B571D49A130}" destId="{7F09A95F-82A9-4AC9-A89D-B7421A924784}" srcOrd="0" destOrd="0" parTransId="{C9351199-9B4B-400A-A272-5690D45D1C42}" sibTransId="{5847742D-A992-49F3-8032-628E2D09F645}"/>
+    <dgm:cxn modelId="{CADB7DAA-19BF-4C88-8F0E-88E930D51C57}" srcId="{A1BABEAD-CBC7-46B2-B177-70DE57BC100A}" destId="{EFD6C8A7-C515-4683-B953-5A1F56185962}" srcOrd="3" destOrd="0" parTransId="{B4EE9A39-2267-4DA8-931F-787DD7E8959B}" sibTransId="{10F2BEBA-6A50-4259-BAB8-C4E8E6B30E67}"/>
+    <dgm:cxn modelId="{B745EA73-8B67-46E6-B64A-3A84BBAAC92F}" type="presOf" srcId="{3C540172-9963-444D-89EF-B6A1458E4567}" destId="{24615AF5-E315-4482-BD03-9303B21B9516}" srcOrd="0" destOrd="0" presId="urn:microsoft.com/office/officeart/2008/layout/SquareAccentList"/>
+    <dgm:cxn modelId="{7EA51AD9-8CD5-47A2-88BF-465A90F8599A}" srcId="{A1BABEAD-CBC7-46B2-B177-70DE57BC100A}" destId="{0058D066-705F-4BC8-B6CD-3F2AD6A31272}" srcOrd="1" destOrd="0" parTransId="{21933D82-8FAA-4405-A468-E3852C880926}" sibTransId="{D4B305F0-F89F-493C-84CC-A3B0144D6EB2}"/>
     <dgm:cxn modelId="{A9CEB793-08EC-4899-8A0E-71527333799A}" srcId="{0058D066-705F-4BC8-B6CD-3F2AD6A31272}" destId="{623F9E21-DDCB-410F-9B34-A8F4A6FC1E83}" srcOrd="1" destOrd="0" parTransId="{5B3FCD9A-F8E8-4BC2-AF25-297F8ECBECBE}" sibTransId="{D62720BA-3A97-45F2-BD37-A039794E2412}"/>
-    <dgm:cxn modelId="{8AE2E80A-E470-4090-B0F6-769DB2DC4F2A}" type="presOf" srcId="{31290AF6-311E-45E6-A478-B3B58A48ADF6}" destId="{D512A050-8FCF-4C71-8C1B-1FEFBE81412B}" srcOrd="0" destOrd="0" presId="urn:microsoft.com/office/officeart/2008/layout/SquareAccentList"/>
-    <dgm:cxn modelId="{8C1B4139-16C2-4E63-A60C-3C2552123055}" srcId="{0058D066-705F-4BC8-B6CD-3F2AD6A31272}" destId="{76CA6376-0F0E-4E77-B3F4-6EF99DABEA85}" srcOrd="0" destOrd="0" parTransId="{AB4106D6-40EE-459D-9D27-9249518709FF}" sibTransId="{9D47891C-3450-4CC8-9072-232BBE565B07}"/>
-    <dgm:cxn modelId="{32447F68-0577-4B00-9418-EFB49A1E074F}" type="presOf" srcId="{0058D066-705F-4BC8-B6CD-3F2AD6A31272}" destId="{33545145-4AD1-4CFA-9EFE-1032A1D1E3C3}" srcOrd="0" destOrd="0" presId="urn:microsoft.com/office/officeart/2008/layout/SquareAccentList"/>
-    <dgm:cxn modelId="{7EA51AD9-8CD5-47A2-88BF-465A90F8599A}" srcId="{A1BABEAD-CBC7-46B2-B177-70DE57BC100A}" destId="{0058D066-705F-4BC8-B6CD-3F2AD6A31272}" srcOrd="1" destOrd="0" parTransId="{21933D82-8FAA-4405-A468-E3852C880926}" sibTransId="{D4B305F0-F89F-493C-84CC-A3B0144D6EB2}"/>
     <dgm:cxn modelId="{4F58FB40-607D-4C41-876B-44B96417FA7B}" type="presOf" srcId="{DEC22A11-969F-4F5C-9D59-699DD54FEC02}" destId="{BDEDC20B-0030-462C-9CA5-FE5A4017A4F2}" srcOrd="0" destOrd="0" presId="urn:microsoft.com/office/officeart/2008/layout/SquareAccentList"/>
-    <dgm:cxn modelId="{FD8A43DF-8155-4809-83FA-3EAE501CD68D}" type="presOf" srcId="{7F09A95F-82A9-4AC9-A89D-B7421A924784}" destId="{9B6DFE0E-5070-4129-9586-A550CD8EC006}" srcOrd="0" destOrd="0" presId="urn:microsoft.com/office/officeart/2008/layout/SquareAccentList"/>
-    <dgm:cxn modelId="{B745EA73-8B67-46E6-B64A-3A84BBAAC92F}" type="presOf" srcId="{3C540172-9963-444D-89EF-B6A1458E4567}" destId="{24615AF5-E315-4482-BD03-9303B21B9516}" srcOrd="0" destOrd="0" presId="urn:microsoft.com/office/officeart/2008/layout/SquareAccentList"/>
-    <dgm:cxn modelId="{7451E383-4758-4679-8A9C-74C514174141}" type="presOf" srcId="{97849881-898F-42A8-A275-175CB69A2C52}" destId="{ACEE5B07-718E-43D3-84A6-02D4F4CBC349}" srcOrd="0" destOrd="0" presId="urn:microsoft.com/office/officeart/2008/layout/SquareAccentList"/>
-    <dgm:cxn modelId="{3A82DE48-2D47-4E1C-8F00-71ED647A8688}" srcId="{3C4E11F8-D49D-484B-B6E2-1B571D49A130}" destId="{FE4C6D14-652B-4754-8144-3905E159B0D0}" srcOrd="3" destOrd="0" parTransId="{B0545279-5BC2-42F8-B2F6-956DD6B3E0FE}" sibTransId="{03157E48-4330-4B6C-AF5B-DDF42CB27CFA}"/>
-    <dgm:cxn modelId="{CADB7DAA-19BF-4C88-8F0E-88E930D51C57}" srcId="{A1BABEAD-CBC7-46B2-B177-70DE57BC100A}" destId="{EFD6C8A7-C515-4683-B953-5A1F56185962}" srcOrd="3" destOrd="0" parTransId="{B4EE9A39-2267-4DA8-931F-787DD7E8959B}" sibTransId="{10F2BEBA-6A50-4259-BAB8-C4E8E6B30E67}"/>
-    <dgm:cxn modelId="{C8A443CF-BF49-4C70-B822-B125E61903B0}" srcId="{3C4E11F8-D49D-484B-B6E2-1B571D49A130}" destId="{531106A9-CA6F-45CA-A702-2B88920528F0}" srcOrd="2" destOrd="0" parTransId="{E0768FC5-6EEA-4BB4-A2C6-1F612CD3FA34}" sibTransId="{F3D16B34-E634-43EF-99E6-DDC8642C89BC}"/>
-    <dgm:cxn modelId="{CA46F927-CF5E-4B4C-92CE-29C5887339A6}" type="presOf" srcId="{DD9FE355-7D2D-40A1-9742-5D69D7A3ABD0}" destId="{9EF74576-6D0C-4892-9ABF-59D675C276E6}" srcOrd="0" destOrd="0" presId="urn:microsoft.com/office/officeart/2008/layout/SquareAccentList"/>
-    <dgm:cxn modelId="{EC23907D-EC4A-4FB8-9DBF-3B56D3B5275F}" srcId="{0058D066-705F-4BC8-B6CD-3F2AD6A31272}" destId="{EB58503F-2E83-4AA4-A594-EC8E4D92B058}" srcOrd="2" destOrd="0" parTransId="{955381EE-DBF2-41D5-BFD9-86D645E0363A}" sibTransId="{112FC456-AB59-4593-AA19-EC7A05760D89}"/>
-    <dgm:cxn modelId="{20F0234D-FE0F-4D45-A853-1474C401E88C}" srcId="{EFD6C8A7-C515-4683-B953-5A1F56185962}" destId="{4FE79E4A-F949-4908-938E-1ED9796B9982}" srcOrd="1" destOrd="0" parTransId="{04495225-83E4-4D15-B255-949CC081F866}" sibTransId="{D893D332-A425-4BD5-BD93-43F228AEAB64}"/>
-    <dgm:cxn modelId="{41B32658-0B90-41EE-9E19-19433B674893}" srcId="{A1BABEAD-CBC7-46B2-B177-70DE57BC100A}" destId="{3C4E11F8-D49D-484B-B6E2-1B571D49A130}" srcOrd="2" destOrd="0" parTransId="{1ED56E8B-4A8C-41FC-A967-DD544C467CC7}" sibTransId="{5697297A-EB04-4F29-A467-12140496CF77}"/>
-    <dgm:cxn modelId="{127CBC0E-35BB-4D48-BD25-CCA9A2EF20DE}" srcId="{A1BABEAD-CBC7-46B2-B177-70DE57BC100A}" destId="{DEC22A11-969F-4F5C-9D59-699DD54FEC02}" srcOrd="0" destOrd="0" parTransId="{6C661981-EA3B-45CF-B978-0EFB13D316CF}" sibTransId="{48BF2438-A9D8-4452-9013-A4A3FE279C7E}"/>
-    <dgm:cxn modelId="{EC195A86-FB41-49CB-BE2D-1109561B9CC7}" type="presOf" srcId="{4FE79E4A-F949-4908-938E-1ED9796B9982}" destId="{BA762BEE-3C48-4825-9C31-9842B6DBBEE2}" srcOrd="0" destOrd="0" presId="urn:microsoft.com/office/officeart/2008/layout/SquareAccentList"/>
-    <dgm:cxn modelId="{D2F63BBE-4E71-464B-A231-DF311DC323CD}" srcId="{EFD6C8A7-C515-4683-B953-5A1F56185962}" destId="{73ADEAC4-E51C-45E9-86C5-46042CCE50AB}" srcOrd="0" destOrd="0" parTransId="{6443C2B3-18DA-41D8-B5D2-A79323ECF104}" sibTransId="{B253071A-C795-4781-AE8F-9393FACC7C0A}"/>
-    <dgm:cxn modelId="{44C7EA5B-F0EC-43E7-AA3D-7D85830DEA6F}" type="presOf" srcId="{3C4E11F8-D49D-484B-B6E2-1B571D49A130}" destId="{023E5550-301C-46DB-9CD8-14629E504E3A}" srcOrd="0" destOrd="0" presId="urn:microsoft.com/office/officeart/2008/layout/SquareAccentList"/>
-    <dgm:cxn modelId="{70D10CCE-E96E-496D-B8CF-6CF846BA53A8}" type="presOf" srcId="{531106A9-CA6F-45CA-A702-2B88920528F0}" destId="{27EE411C-4136-487D-A31D-854035A26545}" srcOrd="0" destOrd="0" presId="urn:microsoft.com/office/officeart/2008/layout/SquareAccentList"/>
-    <dgm:cxn modelId="{41CB56EC-E15B-4213-9B71-59D9911542D8}" srcId="{0058D066-705F-4BC8-B6CD-3F2AD6A31272}" destId="{DD9FE355-7D2D-40A1-9742-5D69D7A3ABD0}" srcOrd="3" destOrd="0" parTransId="{63A91A8A-D721-469E-81A1-8A511F645AD9}" sibTransId="{1EAC100E-1E6A-410B-AC6D-51306040681A}"/>
-    <dgm:cxn modelId="{1C991F4A-C02C-4909-811B-0E4D8A4446A3}" type="presOf" srcId="{76CA6376-0F0E-4E77-B3F4-6EF99DABEA85}" destId="{F05686A4-A2B9-4FA6-A422-04E2CA5C53D1}" srcOrd="0" destOrd="0" presId="urn:microsoft.com/office/officeart/2008/layout/SquareAccentList"/>
-    <dgm:cxn modelId="{B95454D5-79D3-4449-AD18-8056862A8634}" type="presOf" srcId="{EFD6C8A7-C515-4683-B953-5A1F56185962}" destId="{22A10F88-F808-4A46-B596-746C2EDD5252}" srcOrd="0" destOrd="0" presId="urn:microsoft.com/office/officeart/2008/layout/SquareAccentList"/>
-    <dgm:cxn modelId="{36CF7135-5220-4002-9E5C-2C092BBE29D2}" srcId="{3C4E11F8-D49D-484B-B6E2-1B571D49A130}" destId="{3C540172-9963-444D-89EF-B6A1458E4567}" srcOrd="1" destOrd="0" parTransId="{FD7D7879-6A9E-414B-B1EA-FCC989E427E8}" sibTransId="{C47D3724-DD8A-457D-81D9-A308C47B333C}"/>
-    <dgm:cxn modelId="{FE51D39D-29BA-4D0D-A71E-2761AF395740}" type="presOf" srcId="{FE4C6D14-652B-4754-8144-3905E159B0D0}" destId="{8DFBFBA1-7B84-45FB-8ED0-82B80BDF7580}" srcOrd="0" destOrd="0" presId="urn:microsoft.com/office/officeart/2008/layout/SquareAccentList"/>
-    <dgm:cxn modelId="{0A1D0C1F-9614-479A-8725-7370E5FF8309}" srcId="{3C4E11F8-D49D-484B-B6E2-1B571D49A130}" destId="{7F09A95F-82A9-4AC9-A89D-B7421A924784}" srcOrd="0" destOrd="0" parTransId="{C9351199-9B4B-400A-A272-5690D45D1C42}" sibTransId="{5847742D-A992-49F3-8032-628E2D09F645}"/>
-    <dgm:cxn modelId="{928ED363-C61E-4876-9DCA-C2105DA4F8F5}" type="presOf" srcId="{73ADEAC4-E51C-45E9-86C5-46042CCE50AB}" destId="{12620D22-6796-44F3-B441-49330605DF76}" srcOrd="0" destOrd="0" presId="urn:microsoft.com/office/officeart/2008/layout/SquareAccentList"/>
-    <dgm:cxn modelId="{3C1B278A-4150-40E7-ADD2-037B26EA0998}" srcId="{DEC22A11-969F-4F5C-9D59-699DD54FEC02}" destId="{A037CA64-D3FB-49B1-9EAC-682C703A0791}" srcOrd="0" destOrd="0" parTransId="{3DE13768-1DBA-4A6D-8DB0-B684F742B04F}" sibTransId="{38ED1C71-A55B-433B-83F2-AE33C54534A3}"/>
-    <dgm:cxn modelId="{44AEEC49-8089-4653-9D0B-72F03B5EA41C}" type="presOf" srcId="{A1BABEAD-CBC7-46B2-B177-70DE57BC100A}" destId="{2A2D3285-D5AF-4142-9021-DE4EBBEC11B9}" srcOrd="0" destOrd="0" presId="urn:microsoft.com/office/officeart/2008/layout/SquareAccentList"/>
-    <dgm:cxn modelId="{BE98725E-4EF4-4876-9042-5F6E38A0C7CA}" srcId="{DEC22A11-969F-4F5C-9D59-699DD54FEC02}" destId="{97849881-898F-42A8-A275-175CB69A2C52}" srcOrd="2" destOrd="0" parTransId="{3F681C48-1061-4087-A56E-59553125F8B5}" sibTransId="{6C6160B7-72F2-4FBB-A909-1D748A14B09A}"/>
-    <dgm:cxn modelId="{DDF9367F-FA5F-4005-AA1C-4A0B4C4F3595}" type="presOf" srcId="{623F9E21-DDCB-410F-9B34-A8F4A6FC1E83}" destId="{87887977-70EC-400C-9C83-7A9F6BB1988F}" srcOrd="0" destOrd="0" presId="urn:microsoft.com/office/officeart/2008/layout/SquareAccentList"/>
-    <dgm:cxn modelId="{0839AB7B-DB14-444B-800C-787963C4226D}" srcId="{DEC22A11-969F-4F5C-9D59-699DD54FEC02}" destId="{31290AF6-311E-45E6-A478-B3B58A48ADF6}" srcOrd="3" destOrd="0" parTransId="{F24DD968-5EC0-4882-AE94-EA072EBB6E21}" sibTransId="{E9D954F8-7F66-404D-8893-034E7C6F0040}"/>
     <dgm:cxn modelId="{389B5373-D13C-44ED-8FEC-7919764453B8}" type="presParOf" srcId="{2A2D3285-D5AF-4142-9021-DE4EBBEC11B9}" destId="{CCB7A617-71C6-4812-B3F2-A301D85B4E09}" srcOrd="0" destOrd="0" presId="urn:microsoft.com/office/officeart/2008/layout/SquareAccentList"/>
     <dgm:cxn modelId="{96F02448-B497-4683-A403-F96CA400A58E}" type="presParOf" srcId="{CCB7A617-71C6-4812-B3F2-A301D85B4E09}" destId="{D3E87815-0CAE-4AC1-8876-D8FF42D3E796}" srcOrd="0" destOrd="0" presId="urn:microsoft.com/office/officeart/2008/layout/SquareAccentList"/>
     <dgm:cxn modelId="{0955020F-9126-4997-AD4E-6D782BE92FC2}" type="presParOf" srcId="{D3E87815-0CAE-4AC1-8876-D8FF42D3E796}" destId="{9A816E3E-76FF-465E-808B-1786D41F583F}" srcOrd="0" destOrd="0" presId="urn:microsoft.com/office/officeart/2008/layout/SquareAccentList"/>
@@ -5997,7 +6079,7 @@
             <a:fld id="{B61BEF0D-F0BB-DE4B-95CE-6DB70DBA9567}" type="datetimeFigureOut">
               <a:rPr lang="en-US" dirty="0"/>
               <a:pPr/>
-              <a:t>1/16/2021</a:t>
+              <a:t>1/19/2021</a:t>
             </a:fld>
             <a:endParaRPr lang="en-US" dirty="0"/>
           </a:p>
@@ -6332,7 +6414,7 @@
             <a:fld id="{B61BEF0D-F0BB-DE4B-95CE-6DB70DBA9567}" type="datetimeFigureOut">
               <a:rPr lang="en-US" dirty="0"/>
               <a:pPr/>
-              <a:t>1/16/2021</a:t>
+              <a:t>1/19/2021</a:t>
             </a:fld>
             <a:endParaRPr lang="en-US" dirty="0"/>
           </a:p>
@@ -6730,7 +6812,7 @@
             <a:fld id="{B61BEF0D-F0BB-DE4B-95CE-6DB70DBA9567}" type="datetimeFigureOut">
               <a:rPr lang="en-US" dirty="0"/>
               <a:pPr/>
-              <a:t>1/16/2021</a:t>
+              <a:t>1/19/2021</a:t>
             </a:fld>
             <a:endParaRPr lang="en-US" dirty="0"/>
           </a:p>
@@ -7063,7 +7145,7 @@
             <a:fld id="{B61BEF0D-F0BB-DE4B-95CE-6DB70DBA9567}" type="datetimeFigureOut">
               <a:rPr lang="en-US" dirty="0"/>
               <a:pPr/>
-              <a:t>1/16/2021</a:t>
+              <a:t>1/19/2021</a:t>
             </a:fld>
             <a:endParaRPr lang="en-US" dirty="0"/>
           </a:p>
@@ -7380,7 +7462,7 @@
             <a:fld id="{B61BEF0D-F0BB-DE4B-95CE-6DB70DBA9567}" type="datetimeFigureOut">
               <a:rPr lang="en-US" dirty="0"/>
               <a:pPr/>
-              <a:t>1/16/2021</a:t>
+              <a:t>1/19/2021</a:t>
             </a:fld>
             <a:endParaRPr lang="en-US" dirty="0"/>
           </a:p>
@@ -7773,7 +7855,7 @@
             <a:fld id="{B61BEF0D-F0BB-DE4B-95CE-6DB70DBA9567}" type="datetimeFigureOut">
               <a:rPr lang="en-US" dirty="0"/>
               <a:pPr/>
-              <a:t>1/16/2021</a:t>
+              <a:t>1/19/2021</a:t>
             </a:fld>
             <a:endParaRPr lang="en-US" dirty="0"/>
           </a:p>
@@ -8027,7 +8109,7 @@
             <a:fld id="{B61BEF0D-F0BB-DE4B-95CE-6DB70DBA9567}" type="datetimeFigureOut">
               <a:rPr lang="en-US" dirty="0"/>
               <a:pPr/>
-              <a:t>1/16/2021</a:t>
+              <a:t>1/19/2021</a:t>
             </a:fld>
             <a:endParaRPr lang="en-US" dirty="0"/>
           </a:p>
@@ -8286,7 +8368,7 @@
             <a:fld id="{B61BEF0D-F0BB-DE4B-95CE-6DB70DBA9567}" type="datetimeFigureOut">
               <a:rPr lang="en-US" dirty="0"/>
               <a:pPr/>
-              <a:t>1/16/2021</a:t>
+              <a:t>1/19/2021</a:t>
             </a:fld>
             <a:endParaRPr lang="en-US" dirty="0"/>
           </a:p>
@@ -8545,7 +8627,7 @@
             <a:fld id="{B61BEF0D-F0BB-DE4B-95CE-6DB70DBA9567}" type="datetimeFigureOut">
               <a:rPr lang="en-US" dirty="0"/>
               <a:pPr/>
-              <a:t>1/16/2021</a:t>
+              <a:t>1/19/2021</a:t>
             </a:fld>
             <a:endParaRPr lang="en-US" dirty="0"/>
           </a:p>
@@ -8871,7 +8953,7 @@
             <a:fld id="{B61BEF0D-F0BB-DE4B-95CE-6DB70DBA9567}" type="datetimeFigureOut">
               <a:rPr lang="en-US" dirty="0"/>
               <a:pPr/>
-              <a:t>1/16/2021</a:t>
+              <a:t>1/19/2021</a:t>
             </a:fld>
             <a:endParaRPr lang="en-US" dirty="0"/>
           </a:p>
@@ -9191,7 +9273,7 @@
             <a:fld id="{B61BEF0D-F0BB-DE4B-95CE-6DB70DBA9567}" type="datetimeFigureOut">
               <a:rPr lang="en-US" dirty="0"/>
               <a:pPr/>
-              <a:t>1/16/2021</a:t>
+              <a:t>1/19/2021</a:t>
             </a:fld>
             <a:endParaRPr lang="en-US" dirty="0"/>
           </a:p>
@@ -9645,7 +9727,7 @@
             <a:fld id="{B61BEF0D-F0BB-DE4B-95CE-6DB70DBA9567}" type="datetimeFigureOut">
               <a:rPr lang="en-US" dirty="0"/>
               <a:pPr/>
-              <a:t>1/16/2021</a:t>
+              <a:t>1/19/2021</a:t>
             </a:fld>
             <a:endParaRPr lang="en-US" dirty="0"/>
           </a:p>
@@ -9847,7 +9929,7 @@
             <a:fld id="{B61BEF0D-F0BB-DE4B-95CE-6DB70DBA9567}" type="datetimeFigureOut">
               <a:rPr lang="en-US" dirty="0"/>
               <a:pPr/>
-              <a:t>1/16/2021</a:t>
+              <a:t>1/19/2021</a:t>
             </a:fld>
             <a:endParaRPr lang="en-US" dirty="0"/>
           </a:p>
@@ -10021,7 +10103,7 @@
             <a:fld id="{B61BEF0D-F0BB-DE4B-95CE-6DB70DBA9567}" type="datetimeFigureOut">
               <a:rPr lang="en-US" dirty="0"/>
               <a:pPr/>
-              <a:t>1/16/2021</a:t>
+              <a:t>1/19/2021</a:t>
             </a:fld>
             <a:endParaRPr lang="en-US" dirty="0"/>
           </a:p>
@@ -10351,7 +10433,7 @@
             <a:fld id="{B61BEF0D-F0BB-DE4B-95CE-6DB70DBA9567}" type="datetimeFigureOut">
               <a:rPr lang="en-US" dirty="0"/>
               <a:pPr/>
-              <a:t>1/16/2021</a:t>
+              <a:t>1/19/2021</a:t>
             </a:fld>
             <a:endParaRPr lang="en-US" dirty="0"/>
           </a:p>
@@ -10693,7 +10775,7 @@
             <a:fld id="{B61BEF0D-F0BB-DE4B-95CE-6DB70DBA9567}" type="datetimeFigureOut">
               <a:rPr lang="en-US" dirty="0"/>
               <a:pPr/>
-              <a:t>1/16/2021</a:t>
+              <a:t>1/19/2021</a:t>
             </a:fld>
             <a:endParaRPr lang="en-US" dirty="0"/>
           </a:p>
@@ -12807,7 +12889,7 @@
             <a:fld id="{B61BEF0D-F0BB-DE4B-95CE-6DB70DBA9567}" type="datetimeFigureOut">
               <a:rPr lang="en-US" dirty="0"/>
               <a:pPr/>
-              <a:t>1/16/2021</a:t>
+              <a:t>1/19/2021</a:t>
             </a:fld>
             <a:endParaRPr lang="en-US" dirty="0"/>
           </a:p>
@@ -19066,11 +19148,7 @@
                       <a:pPr algn="r"/>
                       <a:r>
                         <a:rPr lang="en-US" dirty="0" smtClean="0"/>
-                        <a:t>2 530 500</a:t>
-                      </a:r>
-                      <a:r>
-                        <a:rPr lang="en-US" dirty="0" smtClean="0"/>
-                        <a:t>,00 €</a:t>
+                        <a:t>2 530 500,00 €</a:t>
                       </a:r>
                       <a:endParaRPr lang="en-US" dirty="0"/>
                     </a:p>
@@ -19110,11 +19188,7 @@
                       <a:pPr algn="r"/>
                       <a:r>
                         <a:rPr lang="en-US" dirty="0" smtClean="0"/>
-                        <a:t>632 992</a:t>
-                      </a:r>
-                      <a:r>
-                        <a:rPr lang="en-US" dirty="0" smtClean="0"/>
-                        <a:t>,00 €</a:t>
+                        <a:t>632 992,00 €</a:t>
                       </a:r>
                       <a:endParaRPr lang="en-US" dirty="0"/>
                     </a:p>
@@ -19158,11 +19232,7 @@
                       <a:pPr algn="r"/>
                       <a:r>
                         <a:rPr lang="en-US" dirty="0" smtClean="0"/>
-                        <a:t>1 090 464</a:t>
-                      </a:r>
-                      <a:r>
-                        <a:rPr lang="en-US" dirty="0" smtClean="0"/>
-                        <a:t>,00 €</a:t>
+                        <a:t>1 090 464,00 €</a:t>
                       </a:r>
                       <a:endParaRPr lang="en-US" dirty="0"/>
                     </a:p>
@@ -19214,11 +19284,7 @@
                       <a:pPr algn="r"/>
                       <a:r>
                         <a:rPr lang="en-US" dirty="0" smtClean="0"/>
-                        <a:t>155 941</a:t>
-                      </a:r>
-                      <a:r>
-                        <a:rPr lang="en-US" dirty="0" smtClean="0"/>
-                        <a:t>,00 €</a:t>
+                        <a:t>155 941,00 €</a:t>
                       </a:r>
                       <a:endParaRPr lang="en-US" dirty="0"/>
                     </a:p>

</xml_diff>